<commit_message>
Deploy website Tue Nov  1 13:09:57 PDT 2022
</commit_message>
<xml_diff>
--- a/assets/slides/fa22/20-Exceptions.pptx
+++ b/assets/slides/fa22/20-Exceptions.pptx
@@ -6997,7 +6997,20 @@
                 <a:effectLst/>
                 <a:latin typeface="Source Code Pro Light" panose="020B0409030403020204" pitchFamily="49" charset="77"/>
               </a:rPr>
-              <a:t>    raise CS88Error('Are you sure you want to take CS88?')</a:t>
+              <a:t>    raise CS88Error('Yo</a:t>
+            </a:r>
+            <a:r>
+              <a:rPr lang="en-US" sz="2000" dirty="0">
+                <a:latin typeface="Source Code Pro Light" panose="020B0409030403020204" pitchFamily="49" charset="77"/>
+              </a:rPr>
+              <a:t>u seem young!</a:t>
+            </a:r>
+            <a:r>
+              <a:rPr lang="en-US" sz="2000" dirty="0">
+                <a:effectLst/>
+                <a:latin typeface="Source Code Pro Light" panose="020B0409030403020204" pitchFamily="49" charset="77"/>
+              </a:rPr>
+              <a:t>')</a:t>
             </a:r>
           </a:p>
           <a:p>
@@ -7009,8 +7022,25 @@
                 <a:effectLst/>
                 <a:latin typeface="Source Code Pro Light" panose="020B0409030403020204" pitchFamily="49" charset="77"/>
               </a:rPr>
-              <a:t>__main__.CS88Error: Are you sure you want to take CS88?</a:t>
-            </a:r>
+              <a:t>__main__.CS88Error</a:t>
+            </a:r>
+            <a:r>
+              <a:rPr lang="en-US" sz="2000">
+                <a:effectLst/>
+                <a:latin typeface="Source Code Pro Light" panose="020B0409030403020204" pitchFamily="49" charset="77"/>
+              </a:rPr>
+              <a:t>: Yo</a:t>
+            </a:r>
+            <a:r>
+              <a:rPr lang="en-US" sz="2000">
+                <a:latin typeface="Source Code Pro Light" panose="020B0409030403020204" pitchFamily="49" charset="77"/>
+              </a:rPr>
+              <a:t>u seem young!</a:t>
+            </a:r>
+            <a:endParaRPr lang="en-US" sz="2000" dirty="0">
+              <a:effectLst/>
+              <a:latin typeface="Source Code Pro Light" panose="020B0409030403020204" pitchFamily="49" charset="77"/>
+            </a:endParaRPr>
           </a:p>
         </p:txBody>
       </p:sp>

</xml_diff>